<commit_message>
sept 27 22 slides
</commit_message>
<xml_diff>
--- a/Lectures/10-model-selection-and-validation-part-1.pptx
+++ b/Lectures/10-model-selection-and-validation-part-1.pptx
@@ -5,37 +5,39 @@
     <p:sldMasterId id="2147483648" r:id="rId1"/>
   </p:sldMasterIdLst>
   <p:notesMasterIdLst>
-    <p:notesMasterId r:id="rId30"/>
+    <p:notesMasterId r:id="rId32"/>
   </p:notesMasterIdLst>
   <p:sldIdLst>
     <p:sldId id="256" r:id="rId2"/>
-    <p:sldId id="471" r:id="rId3"/>
-    <p:sldId id="318" r:id="rId4"/>
-    <p:sldId id="323" r:id="rId5"/>
-    <p:sldId id="286" r:id="rId6"/>
-    <p:sldId id="472" r:id="rId7"/>
-    <p:sldId id="287" r:id="rId8"/>
-    <p:sldId id="478" r:id="rId9"/>
-    <p:sldId id="468" r:id="rId10"/>
-    <p:sldId id="475" r:id="rId11"/>
-    <p:sldId id="453" r:id="rId12"/>
-    <p:sldId id="352" r:id="rId13"/>
-    <p:sldId id="458" r:id="rId14"/>
-    <p:sldId id="484" r:id="rId15"/>
-    <p:sldId id="457" r:id="rId16"/>
-    <p:sldId id="428" r:id="rId17"/>
-    <p:sldId id="455" r:id="rId18"/>
-    <p:sldId id="429" r:id="rId19"/>
-    <p:sldId id="430" r:id="rId20"/>
-    <p:sldId id="460" r:id="rId21"/>
-    <p:sldId id="420" r:id="rId22"/>
-    <p:sldId id="486" r:id="rId23"/>
-    <p:sldId id="479" r:id="rId24"/>
-    <p:sldId id="481" r:id="rId25"/>
-    <p:sldId id="480" r:id="rId26"/>
-    <p:sldId id="482" r:id="rId27"/>
-    <p:sldId id="483" r:id="rId28"/>
-    <p:sldId id="485" r:id="rId29"/>
+    <p:sldId id="491" r:id="rId3"/>
+    <p:sldId id="471" r:id="rId4"/>
+    <p:sldId id="318" r:id="rId5"/>
+    <p:sldId id="323" r:id="rId6"/>
+    <p:sldId id="286" r:id="rId7"/>
+    <p:sldId id="472" r:id="rId8"/>
+    <p:sldId id="287" r:id="rId9"/>
+    <p:sldId id="478" r:id="rId10"/>
+    <p:sldId id="468" r:id="rId11"/>
+    <p:sldId id="492" r:id="rId12"/>
+    <p:sldId id="475" r:id="rId13"/>
+    <p:sldId id="453" r:id="rId14"/>
+    <p:sldId id="352" r:id="rId15"/>
+    <p:sldId id="458" r:id="rId16"/>
+    <p:sldId id="484" r:id="rId17"/>
+    <p:sldId id="457" r:id="rId18"/>
+    <p:sldId id="428" r:id="rId19"/>
+    <p:sldId id="455" r:id="rId20"/>
+    <p:sldId id="429" r:id="rId21"/>
+    <p:sldId id="430" r:id="rId22"/>
+    <p:sldId id="460" r:id="rId23"/>
+    <p:sldId id="420" r:id="rId24"/>
+    <p:sldId id="486" r:id="rId25"/>
+    <p:sldId id="479" r:id="rId26"/>
+    <p:sldId id="481" r:id="rId27"/>
+    <p:sldId id="480" r:id="rId28"/>
+    <p:sldId id="482" r:id="rId29"/>
+    <p:sldId id="483" r:id="rId30"/>
+    <p:sldId id="487" r:id="rId31"/>
   </p:sldIdLst>
   <p:sldSz cx="12192000" cy="6858000"/>
   <p:notesSz cx="6858000" cy="9144000"/>
@@ -273,7 +275,7 @@
       <p15:sldGuideLst xmlns:p15="http://schemas.microsoft.com/office/powerpoint/2012/main"/>
     </p:ext>
     <p:ext uri="http://customooxmlschemas.google.com/">
-      <go:slidesCustomData xmlns="" xmlns:mc="http://schemas.openxmlformats.org/markup-compatibility/2006" xmlns:mv="urn:schemas-microsoft-com:mac:vml" xmlns:c="http://schemas.openxmlformats.org/drawingml/2006/chart" xmlns:dgm="http://schemas.openxmlformats.org/drawingml/2006/diagram" xmlns:o="urn:schemas-microsoft-com:office:office" xmlns:v="urn:schemas-microsoft-com:vml" xmlns:pvml="urn:schemas-microsoft-com:office:powerpoint" xmlns:com="http://schemas.openxmlformats.org/drawingml/2006/compatibility" xmlns:p14="http://schemas.microsoft.com/office/powerpoint/2010/main" xmlns:p15="http://schemas.microsoft.com/office/powerpoint/2012/main" xmlns:go="http://customooxmlschemas.google.com/" r:id="rId40" roundtripDataSignature="AMtx7mjFyVUGRZWio+dc9dxzYsimUxNJbg=="/>
+      <go:slidesCustomData xmlns:go="http://customooxmlschemas.google.com/" xmlns:p15="http://schemas.microsoft.com/office/powerpoint/2012/main" xmlns:p14="http://schemas.microsoft.com/office/powerpoint/2010/main" xmlns:com="http://schemas.openxmlformats.org/drawingml/2006/compatibility" xmlns:pvml="urn:schemas-microsoft-com:office:powerpoint" xmlns:v="urn:schemas-microsoft-com:vml" xmlns:o="urn:schemas-microsoft-com:office:office" xmlns:dgm="http://schemas.openxmlformats.org/drawingml/2006/diagram" xmlns:c="http://schemas.openxmlformats.org/drawingml/2006/chart" xmlns:mv="urn:schemas-microsoft-com:mac:vml" xmlns:mc="http://schemas.openxmlformats.org/markup-compatibility/2006" xmlns="" r:id="rId40" roundtripDataSignature="AMtx7mjFyVUGRZWio+dc9dxzYsimUxNJbg=="/>
     </p:ext>
   </p:extLst>
 </p:presentation>
@@ -9777,6 +9779,541 @@
       </p:grpSpPr>
       <p:sp>
         <p:nvSpPr>
+          <p:cNvPr id="4" name="Title 3">
+            <a:extLst>
+              <a:ext uri="{FF2B5EF4-FFF2-40B4-BE49-F238E27FC236}">
+                <a16:creationId xmlns:a16="http://schemas.microsoft.com/office/drawing/2014/main" id="{30C2C959-72F2-EF4D-80DA-F48A29D0F3C4}"/>
+              </a:ext>
+            </a:extLst>
+          </p:cNvPr>
+          <p:cNvSpPr>
+            <a:spLocks noGrp="1"/>
+          </p:cNvSpPr>
+          <p:nvPr>
+            <p:ph type="title"/>
+          </p:nvPr>
+        </p:nvSpPr>
+        <p:spPr/>
+        <p:txBody>
+          <a:bodyPr/>
+          <a:lstStyle/>
+          <a:p>
+            <a:r>
+              <a:rPr lang="en-US" dirty="0"/>
+              <a:t>What do we need our selected model to do?</a:t>
+            </a:r>
+          </a:p>
+        </p:txBody>
+      </p:sp>
+      <p:sp>
+        <p:nvSpPr>
+          <p:cNvPr id="5" name="Text Placeholder 4">
+            <a:extLst>
+              <a:ext uri="{FF2B5EF4-FFF2-40B4-BE49-F238E27FC236}">
+                <a16:creationId xmlns:a16="http://schemas.microsoft.com/office/drawing/2014/main" id="{24A75FF1-9EFE-0F41-92F5-3E749CFB2EB5}"/>
+              </a:ext>
+            </a:extLst>
+          </p:cNvPr>
+          <p:cNvSpPr>
+            <a:spLocks noGrp="1"/>
+          </p:cNvSpPr>
+          <p:nvPr>
+            <p:ph type="body" idx="1"/>
+          </p:nvPr>
+        </p:nvSpPr>
+        <p:spPr/>
+        <p:txBody>
+          <a:bodyPr/>
+          <a:lstStyle/>
+          <a:p>
+            <a:r>
+              <a:rPr lang="en-US" dirty="0"/>
+              <a:t>Perform well</a:t>
+            </a:r>
+          </a:p>
+          <a:p>
+            <a:pPr lvl="1"/>
+            <a:r>
+              <a:rPr lang="en-US" dirty="0"/>
+              <a:t>What metric?</a:t>
+            </a:r>
+          </a:p>
+          <a:p>
+            <a:pPr lvl="1"/>
+            <a:r>
+              <a:rPr lang="en-US" dirty="0"/>
+              <a:t>Compared to what?</a:t>
+            </a:r>
+          </a:p>
+          <a:p>
+            <a:endParaRPr lang="en-US" dirty="0"/>
+          </a:p>
+          <a:p>
+            <a:r>
+              <a:rPr lang="en-US" dirty="0"/>
+              <a:t>Generalize</a:t>
+            </a:r>
+          </a:p>
+          <a:p>
+            <a:pPr lvl="1"/>
+            <a:r>
+              <a:rPr lang="en-US" dirty="0"/>
+              <a:t>To what?</a:t>
+            </a:r>
+          </a:p>
+        </p:txBody>
+      </p:sp>
+    </p:spTree>
+    <p:extLst>
+      <p:ext uri="{BB962C8B-B14F-4D97-AF65-F5344CB8AC3E}">
+        <p14:creationId xmlns:p14="http://schemas.microsoft.com/office/powerpoint/2010/main" val="4111643116"/>
+      </p:ext>
+    </p:extLst>
+  </p:cSld>
+  <p:clrMapOvr>
+    <a:masterClrMapping/>
+  </p:clrMapOvr>
+  <mc:AlternateContent xmlns:mc="http://schemas.openxmlformats.org/markup-compatibility/2006" xmlns:p14="http://schemas.microsoft.com/office/powerpoint/2010/main">
+    <mc:Choice Requires="p14">
+      <p:transition spd="med" p14:dur="700">
+        <p:fade/>
+      </p:transition>
+    </mc:Choice>
+    <mc:Fallback xmlns="">
+      <p:transition spd="med">
+        <p:fade/>
+      </p:transition>
+    </mc:Fallback>
+  </mc:AlternateContent>
+</p:sld>
+</file>
+
+<file path=ppt/slides/slide11.xml><?xml version="1.0" encoding="utf-8"?>
+<p:sld xmlns:a="http://schemas.openxmlformats.org/drawingml/2006/main" xmlns:r="http://schemas.openxmlformats.org/officeDocument/2006/relationships" xmlns:p="http://schemas.openxmlformats.org/presentationml/2006/main">
+  <p:cSld>
+    <p:spTree>
+      <p:nvGrpSpPr>
+        <p:cNvPr id="1" name=""/>
+        <p:cNvGrpSpPr/>
+        <p:nvPr/>
+      </p:nvGrpSpPr>
+      <p:grpSpPr>
+        <a:xfrm>
+          <a:off x="0" y="0"/>
+          <a:ext cx="0" cy="0"/>
+          <a:chOff x="0" y="0"/>
+          <a:chExt cx="0" cy="0"/>
+        </a:xfrm>
+      </p:grpSpPr>
+      <p:sp>
+        <p:nvSpPr>
+          <p:cNvPr id="3" name="Title 2">
+            <a:extLst>
+              <a:ext uri="{FF2B5EF4-FFF2-40B4-BE49-F238E27FC236}">
+                <a16:creationId xmlns:a16="http://schemas.microsoft.com/office/drawing/2014/main" id="{9323871C-7CA8-1448-8FFC-1AE6E1838941}"/>
+              </a:ext>
+            </a:extLst>
+          </p:cNvPr>
+          <p:cNvSpPr>
+            <a:spLocks noGrp="1"/>
+          </p:cNvSpPr>
+          <p:nvPr>
+            <p:ph type="title"/>
+          </p:nvPr>
+        </p:nvSpPr>
+        <p:spPr/>
+        <p:txBody>
+          <a:bodyPr/>
+          <a:lstStyle/>
+          <a:p>
+            <a:endParaRPr lang="en-US" dirty="0"/>
+          </a:p>
+        </p:txBody>
+      </p:sp>
+      <p:sp>
+        <p:nvSpPr>
+          <p:cNvPr id="4" name="Text Placeholder 3">
+            <a:extLst>
+              <a:ext uri="{FF2B5EF4-FFF2-40B4-BE49-F238E27FC236}">
+                <a16:creationId xmlns:a16="http://schemas.microsoft.com/office/drawing/2014/main" id="{5E600BA7-FA45-884F-9820-9E5F2CB7AA48}"/>
+              </a:ext>
+            </a:extLst>
+          </p:cNvPr>
+          <p:cNvSpPr>
+            <a:spLocks noGrp="1"/>
+          </p:cNvSpPr>
+          <p:nvPr>
+            <p:ph type="body" idx="1"/>
+          </p:nvPr>
+        </p:nvSpPr>
+        <p:spPr>
+          <a:xfrm>
+            <a:off x="415600" y="1130134"/>
+            <a:ext cx="11360700" cy="4555200"/>
+          </a:xfrm>
+        </p:spPr>
+        <p:txBody>
+          <a:bodyPr/>
+          <a:lstStyle/>
+          <a:p>
+            <a:pPr marL="76200" indent="0">
+              <a:buNone/>
+            </a:pPr>
+            <a:r>
+              <a:rPr lang="en-US" sz="2800" b="0" i="0" dirty="0">
+                <a:effectLst/>
+                <a:latin typeface="Roboto" panose="02000000000000000000" pitchFamily="2" charset="0"/>
+              </a:rPr>
+              <a:t>You're working for a non-profit and a vendor is trying to sell you a donation propensity model that is validated to have 98% accuracy. Is this model good enough for your organization to purchase?</a:t>
+            </a:r>
+            <a:endParaRPr lang="en-US" sz="4400" dirty="0"/>
+          </a:p>
+        </p:txBody>
+      </p:sp>
+      <p:sp>
+        <p:nvSpPr>
+          <p:cNvPr id="5" name="Text Placeholder 3">
+            <a:extLst>
+              <a:ext uri="{FF2B5EF4-FFF2-40B4-BE49-F238E27FC236}">
+                <a16:creationId xmlns:a16="http://schemas.microsoft.com/office/drawing/2014/main" id="{0CF60459-98F0-E844-AFCC-DC0705B0478D}"/>
+              </a:ext>
+            </a:extLst>
+          </p:cNvPr>
+          <p:cNvSpPr txBox="1">
+            <a:spLocks/>
+          </p:cNvSpPr>
+          <p:nvPr/>
+        </p:nvSpPr>
+        <p:spPr>
+          <a:xfrm>
+            <a:off x="3652512" y="3407734"/>
+            <a:ext cx="4886875" cy="2794571"/>
+          </a:xfrm>
+          <a:prstGeom prst="rect">
+            <a:avLst/>
+          </a:prstGeom>
+          <a:noFill/>
+          <a:ln>
+            <a:noFill/>
+          </a:ln>
+        </p:spPr>
+        <p:txBody>
+          <a:bodyPr spcFirstLastPara="1" wrap="none" lIns="121900" tIns="121900" rIns="121900" bIns="121900" rtlCol="0" anchor="t" anchorCtr="0">
+            <a:spAutoFit/>
+          </a:bodyPr>
+          <a:lstStyle>
+            <a:defPPr marR="0" lvl="0" algn="l" rtl="0">
+              <a:lnSpc>
+                <a:spcPct val="100000"/>
+              </a:lnSpc>
+              <a:spcBef>
+                <a:spcPts val="0"/>
+              </a:spcBef>
+              <a:spcAft>
+                <a:spcPts val="0"/>
+              </a:spcAft>
+            </a:defPPr>
+            <a:lvl1pPr marL="457200" marR="0" lvl="0" indent="-381000" algn="l" rtl="0">
+              <a:lnSpc>
+                <a:spcPct val="115000"/>
+              </a:lnSpc>
+              <a:spcBef>
+                <a:spcPts val="0"/>
+              </a:spcBef>
+              <a:spcAft>
+                <a:spcPts val="0"/>
+              </a:spcAft>
+              <a:buClr>
+                <a:srgbClr val="434343"/>
+              </a:buClr>
+              <a:buSzPts val="2400"/>
+              <a:buFont typeface="Arial"/>
+              <a:buChar char="●"/>
+              <a:defRPr sz="2400" b="0" i="0" u="none" strike="noStrike" cap="none">
+                <a:solidFill>
+                  <a:srgbClr val="434343"/>
+                </a:solidFill>
+                <a:latin typeface="Arial"/>
+                <a:ea typeface="Arial"/>
+                <a:cs typeface="Arial"/>
+                <a:sym typeface="Arial"/>
+              </a:defRPr>
+            </a:lvl1pPr>
+            <a:lvl2pPr marL="914400" marR="0" lvl="1" indent="-349250" algn="l" rtl="0">
+              <a:lnSpc>
+                <a:spcPct val="115000"/>
+              </a:lnSpc>
+              <a:spcBef>
+                <a:spcPts val="2100"/>
+              </a:spcBef>
+              <a:spcAft>
+                <a:spcPts val="0"/>
+              </a:spcAft>
+              <a:buClr>
+                <a:srgbClr val="434343"/>
+              </a:buClr>
+              <a:buSzPts val="1900"/>
+              <a:buFont typeface="Arial"/>
+              <a:buChar char="○"/>
+              <a:defRPr sz="1900" b="0" i="0" u="none" strike="noStrike" cap="none">
+                <a:solidFill>
+                  <a:srgbClr val="434343"/>
+                </a:solidFill>
+                <a:latin typeface="Arial"/>
+                <a:ea typeface="Arial"/>
+                <a:cs typeface="Arial"/>
+                <a:sym typeface="Arial"/>
+              </a:defRPr>
+            </a:lvl2pPr>
+            <a:lvl3pPr marL="1371600" marR="0" lvl="2" indent="-349250" algn="l" rtl="0">
+              <a:lnSpc>
+                <a:spcPct val="115000"/>
+              </a:lnSpc>
+              <a:spcBef>
+                <a:spcPts val="2100"/>
+              </a:spcBef>
+              <a:spcAft>
+                <a:spcPts val="0"/>
+              </a:spcAft>
+              <a:buClr>
+                <a:srgbClr val="434343"/>
+              </a:buClr>
+              <a:buSzPts val="1900"/>
+              <a:buFont typeface="Arial"/>
+              <a:buChar char="■"/>
+              <a:defRPr sz="1900" b="0" i="0" u="none" strike="noStrike" cap="none">
+                <a:solidFill>
+                  <a:srgbClr val="434343"/>
+                </a:solidFill>
+                <a:latin typeface="Arial"/>
+                <a:ea typeface="Arial"/>
+                <a:cs typeface="Arial"/>
+                <a:sym typeface="Arial"/>
+              </a:defRPr>
+            </a:lvl3pPr>
+            <a:lvl4pPr marL="1828800" marR="0" lvl="3" indent="-349250" algn="l" rtl="0">
+              <a:lnSpc>
+                <a:spcPct val="115000"/>
+              </a:lnSpc>
+              <a:spcBef>
+                <a:spcPts val="2100"/>
+              </a:spcBef>
+              <a:spcAft>
+                <a:spcPts val="0"/>
+              </a:spcAft>
+              <a:buClr>
+                <a:srgbClr val="434343"/>
+              </a:buClr>
+              <a:buSzPts val="1900"/>
+              <a:buFont typeface="Arial"/>
+              <a:buChar char="●"/>
+              <a:defRPr sz="1900" b="0" i="0" u="none" strike="noStrike" cap="none">
+                <a:solidFill>
+                  <a:srgbClr val="434343"/>
+                </a:solidFill>
+                <a:latin typeface="Arial"/>
+                <a:ea typeface="Arial"/>
+                <a:cs typeface="Arial"/>
+                <a:sym typeface="Arial"/>
+              </a:defRPr>
+            </a:lvl4pPr>
+            <a:lvl5pPr marL="2286000" marR="0" lvl="4" indent="-349250" algn="l" rtl="0">
+              <a:lnSpc>
+                <a:spcPct val="115000"/>
+              </a:lnSpc>
+              <a:spcBef>
+                <a:spcPts val="2100"/>
+              </a:spcBef>
+              <a:spcAft>
+                <a:spcPts val="0"/>
+              </a:spcAft>
+              <a:buClr>
+                <a:srgbClr val="434343"/>
+              </a:buClr>
+              <a:buSzPts val="1900"/>
+              <a:buFont typeface="Arial"/>
+              <a:buChar char="○"/>
+              <a:defRPr sz="1900" b="0" i="0" u="none" strike="noStrike" cap="none">
+                <a:solidFill>
+                  <a:srgbClr val="434343"/>
+                </a:solidFill>
+                <a:latin typeface="Arial"/>
+                <a:ea typeface="Arial"/>
+                <a:cs typeface="Arial"/>
+                <a:sym typeface="Arial"/>
+              </a:defRPr>
+            </a:lvl5pPr>
+            <a:lvl6pPr marL="2743200" marR="0" lvl="5" indent="-349250" algn="l" rtl="0">
+              <a:lnSpc>
+                <a:spcPct val="115000"/>
+              </a:lnSpc>
+              <a:spcBef>
+                <a:spcPts val="2100"/>
+              </a:spcBef>
+              <a:spcAft>
+                <a:spcPts val="0"/>
+              </a:spcAft>
+              <a:buClr>
+                <a:srgbClr val="434343"/>
+              </a:buClr>
+              <a:buSzPts val="1900"/>
+              <a:buFont typeface="Arial"/>
+              <a:buChar char="■"/>
+              <a:defRPr sz="1900" b="0" i="0" u="none" strike="noStrike" cap="none">
+                <a:solidFill>
+                  <a:srgbClr val="434343"/>
+                </a:solidFill>
+                <a:latin typeface="Arial"/>
+                <a:ea typeface="Arial"/>
+                <a:cs typeface="Arial"/>
+                <a:sym typeface="Arial"/>
+              </a:defRPr>
+            </a:lvl6pPr>
+            <a:lvl7pPr marL="3200400" marR="0" lvl="6" indent="-349250" algn="l" rtl="0">
+              <a:lnSpc>
+                <a:spcPct val="115000"/>
+              </a:lnSpc>
+              <a:spcBef>
+                <a:spcPts val="2100"/>
+              </a:spcBef>
+              <a:spcAft>
+                <a:spcPts val="0"/>
+              </a:spcAft>
+              <a:buClr>
+                <a:srgbClr val="434343"/>
+              </a:buClr>
+              <a:buSzPts val="1900"/>
+              <a:buFont typeface="Arial"/>
+              <a:buChar char="●"/>
+              <a:defRPr sz="1900" b="0" i="0" u="none" strike="noStrike" cap="none">
+                <a:solidFill>
+                  <a:srgbClr val="434343"/>
+                </a:solidFill>
+                <a:latin typeface="Arial"/>
+                <a:ea typeface="Arial"/>
+                <a:cs typeface="Arial"/>
+                <a:sym typeface="Arial"/>
+              </a:defRPr>
+            </a:lvl7pPr>
+            <a:lvl8pPr marL="3657600" marR="0" lvl="7" indent="-349250" algn="l" rtl="0">
+              <a:lnSpc>
+                <a:spcPct val="115000"/>
+              </a:lnSpc>
+              <a:spcBef>
+                <a:spcPts val="2100"/>
+              </a:spcBef>
+              <a:spcAft>
+                <a:spcPts val="0"/>
+              </a:spcAft>
+              <a:buClr>
+                <a:srgbClr val="434343"/>
+              </a:buClr>
+              <a:buSzPts val="1900"/>
+              <a:buFont typeface="Arial"/>
+              <a:buChar char="○"/>
+              <a:defRPr sz="1900" b="0" i="0" u="none" strike="noStrike" cap="none">
+                <a:solidFill>
+                  <a:srgbClr val="434343"/>
+                </a:solidFill>
+                <a:latin typeface="Arial"/>
+                <a:ea typeface="Arial"/>
+                <a:cs typeface="Arial"/>
+                <a:sym typeface="Arial"/>
+              </a:defRPr>
+            </a:lvl8pPr>
+            <a:lvl9pPr marL="4114800" marR="0" lvl="8" indent="-349250" algn="l" rtl="0">
+              <a:lnSpc>
+                <a:spcPct val="115000"/>
+              </a:lnSpc>
+              <a:spcBef>
+                <a:spcPts val="2100"/>
+              </a:spcBef>
+              <a:spcAft>
+                <a:spcPts val="2100"/>
+              </a:spcAft>
+              <a:buClr>
+                <a:srgbClr val="434343"/>
+              </a:buClr>
+              <a:buSzPts val="1900"/>
+              <a:buFont typeface="Arial"/>
+              <a:buChar char="■"/>
+              <a:defRPr sz="1900" b="0" i="0" u="none" strike="noStrike" cap="none">
+                <a:solidFill>
+                  <a:srgbClr val="434343"/>
+                </a:solidFill>
+                <a:latin typeface="Arial"/>
+                <a:ea typeface="Arial"/>
+                <a:cs typeface="Arial"/>
+                <a:sym typeface="Arial"/>
+              </a:defRPr>
+            </a:lvl9pPr>
+          </a:lstStyle>
+          <a:p>
+            <a:pPr marL="114300" indent="0" algn="ctr">
+              <a:buFont typeface="Arial"/>
+              <a:buNone/>
+            </a:pPr>
+            <a:r>
+              <a:rPr lang="en-US" sz="4800" dirty="0" err="1"/>
+              <a:t>sli.do</a:t>
+            </a:r>
+            <a:r>
+              <a:rPr lang="en-US" sz="4800" dirty="0"/>
+              <a:t>      #94889</a:t>
+            </a:r>
+          </a:p>
+          <a:p>
+            <a:pPr algn="ctr"/>
+            <a:endParaRPr lang="en-US" sz="4800" dirty="0"/>
+          </a:p>
+          <a:p>
+            <a:pPr marL="114300" indent="0" algn="ctr">
+              <a:buFont typeface="Arial"/>
+              <a:buNone/>
+            </a:pPr>
+            <a:r>
+              <a:rPr lang="en-US" sz="4800" dirty="0" err="1"/>
+              <a:t>sli.do</a:t>
+            </a:r>
+            <a:r>
+              <a:rPr lang="en-US" sz="4800" dirty="0"/>
+              <a:t>/94889</a:t>
+            </a:r>
+          </a:p>
+        </p:txBody>
+      </p:sp>
+    </p:spTree>
+    <p:extLst>
+      <p:ext uri="{BB962C8B-B14F-4D97-AF65-F5344CB8AC3E}">
+        <p14:creationId xmlns:p14="http://schemas.microsoft.com/office/powerpoint/2010/main" val="1361958053"/>
+      </p:ext>
+    </p:extLst>
+  </p:cSld>
+  <p:clrMapOvr>
+    <a:masterClrMapping/>
+  </p:clrMapOvr>
+</p:sld>
+</file>
+
+<file path=ppt/slides/slide12.xml><?xml version="1.0" encoding="utf-8"?>
+<p:sld xmlns:a="http://schemas.openxmlformats.org/drawingml/2006/main" xmlns:r="http://schemas.openxmlformats.org/officeDocument/2006/relationships" xmlns:p="http://schemas.openxmlformats.org/presentationml/2006/main">
+  <p:cSld>
+    <p:spTree>
+      <p:nvGrpSpPr>
+        <p:cNvPr id="1" name=""/>
+        <p:cNvGrpSpPr/>
+        <p:nvPr/>
+      </p:nvGrpSpPr>
+      <p:grpSpPr>
+        <a:xfrm>
+          <a:off x="0" y="0"/>
+          <a:ext cx="0" cy="0"/>
+          <a:chOff x="0" y="0"/>
+          <a:chExt cx="0" cy="0"/>
+        </a:xfrm>
+      </p:grpSpPr>
+      <p:sp>
+        <p:nvSpPr>
           <p:cNvPr id="2" name="Title 1">
             <a:extLst>
               <a:ext uri="{FF2B5EF4-FFF2-40B4-BE49-F238E27FC236}">
@@ -9841,7 +10378,7 @@
 </p:sld>
 </file>
 
-<file path=ppt/slides/slide11.xml><?xml version="1.0" encoding="utf-8"?>
+<file path=ppt/slides/slide13.xml><?xml version="1.0" encoding="utf-8"?>
 <p:sld xmlns:a="http://schemas.openxmlformats.org/drawingml/2006/main" xmlns:r="http://schemas.openxmlformats.org/officeDocument/2006/relationships" xmlns:p="http://schemas.openxmlformats.org/presentationml/2006/main">
   <p:cSld>
     <p:spTree>
@@ -10038,7 +10575,7 @@
 </p:sld>
 </file>
 
-<file path=ppt/slides/slide12.xml><?xml version="1.0" encoding="utf-8"?>
+<file path=ppt/slides/slide14.xml><?xml version="1.0" encoding="utf-8"?>
 <p:sld xmlns:a="http://schemas.openxmlformats.org/drawingml/2006/main" xmlns:r="http://schemas.openxmlformats.org/officeDocument/2006/relationships" xmlns:p="http://schemas.openxmlformats.org/presentationml/2006/main">
   <p:cSld>
     <p:spTree>
@@ -11210,7 +11747,7 @@
 </p:sld>
 </file>
 
-<file path=ppt/slides/slide13.xml><?xml version="1.0" encoding="utf-8"?>
+<file path=ppt/slides/slide15.xml><?xml version="1.0" encoding="utf-8"?>
 <p:sld xmlns:a="http://schemas.openxmlformats.org/drawingml/2006/main" xmlns:r="http://schemas.openxmlformats.org/officeDocument/2006/relationships" xmlns:p="http://schemas.openxmlformats.org/presentationml/2006/main">
   <p:cSld>
     <p:spTree>
@@ -12538,7 +13075,7 @@
 </p:sld>
 </file>
 
-<file path=ppt/slides/slide14.xml><?xml version="1.0" encoding="utf-8"?>
+<file path=ppt/slides/slide16.xml><?xml version="1.0" encoding="utf-8"?>
 <p:sld xmlns:a="http://schemas.openxmlformats.org/drawingml/2006/main" xmlns:r="http://schemas.openxmlformats.org/officeDocument/2006/relationships" xmlns:p="http://schemas.openxmlformats.org/presentationml/2006/main">
   <p:cSld>
     <p:spTree>
@@ -12626,7 +13163,7 @@
 </p:sld>
 </file>
 
-<file path=ppt/slides/slide15.xml><?xml version="1.0" encoding="utf-8"?>
+<file path=ppt/slides/slide17.xml><?xml version="1.0" encoding="utf-8"?>
 <p:sld xmlns:a="http://schemas.openxmlformats.org/drawingml/2006/main" xmlns:r="http://schemas.openxmlformats.org/officeDocument/2006/relationships" xmlns:p="http://schemas.openxmlformats.org/presentationml/2006/main">
   <p:cSld>
     <p:spTree>
@@ -12830,7 +13367,7 @@
 </p:sld>
 </file>
 
-<file path=ppt/slides/slide16.xml><?xml version="1.0" encoding="utf-8"?>
+<file path=ppt/slides/slide18.xml><?xml version="1.0" encoding="utf-8"?>
 <p:sld xmlns:a="http://schemas.openxmlformats.org/drawingml/2006/main" xmlns:r="http://schemas.openxmlformats.org/officeDocument/2006/relationships" xmlns:p="http://schemas.openxmlformats.org/presentationml/2006/main">
   <p:cSld>
     <p:spTree>
@@ -13421,7 +13958,7 @@
 </p:sld>
 </file>
 
-<file path=ppt/slides/slide17.xml><?xml version="1.0" encoding="utf-8"?>
+<file path=ppt/slides/slide19.xml><?xml version="1.0" encoding="utf-8"?>
 <p:sld xmlns:a="http://schemas.openxmlformats.org/drawingml/2006/main" xmlns:r="http://schemas.openxmlformats.org/officeDocument/2006/relationships" xmlns:p="http://schemas.openxmlformats.org/presentationml/2006/main">
   <p:cSld>
     <p:spTree>
@@ -13531,7 +14068,413 @@
 </p:sld>
 </file>
 
-<file path=ppt/slides/slide18.xml><?xml version="1.0" encoding="utf-8"?>
+<file path=ppt/slides/slide2.xml><?xml version="1.0" encoding="utf-8"?>
+<p:sld xmlns:a="http://schemas.openxmlformats.org/drawingml/2006/main" xmlns:r="http://schemas.openxmlformats.org/officeDocument/2006/relationships" xmlns:p="http://schemas.openxmlformats.org/presentationml/2006/main">
+  <p:cSld>
+    <p:spTree>
+      <p:nvGrpSpPr>
+        <p:cNvPr id="1" name=""/>
+        <p:cNvGrpSpPr/>
+        <p:nvPr/>
+      </p:nvGrpSpPr>
+      <p:grpSpPr>
+        <a:xfrm>
+          <a:off x="0" y="0"/>
+          <a:ext cx="0" cy="0"/>
+          <a:chOff x="0" y="0"/>
+          <a:chExt cx="0" cy="0"/>
+        </a:xfrm>
+      </p:grpSpPr>
+      <p:sp>
+        <p:nvSpPr>
+          <p:cNvPr id="3" name="Title 2">
+            <a:extLst>
+              <a:ext uri="{FF2B5EF4-FFF2-40B4-BE49-F238E27FC236}">
+                <a16:creationId xmlns:a16="http://schemas.microsoft.com/office/drawing/2014/main" id="{9323871C-7CA8-1448-8FFC-1AE6E1838941}"/>
+              </a:ext>
+            </a:extLst>
+          </p:cNvPr>
+          <p:cNvSpPr>
+            <a:spLocks noGrp="1"/>
+          </p:cNvSpPr>
+          <p:nvPr>
+            <p:ph type="title"/>
+          </p:nvPr>
+        </p:nvSpPr>
+        <p:spPr/>
+        <p:txBody>
+          <a:bodyPr/>
+          <a:lstStyle/>
+          <a:p>
+            <a:r>
+              <a:rPr lang="en-US" dirty="0"/>
+              <a:t>Teamwork Question</a:t>
+            </a:r>
+          </a:p>
+        </p:txBody>
+      </p:sp>
+      <p:sp>
+        <p:nvSpPr>
+          <p:cNvPr id="4" name="Text Placeholder 3">
+            <a:extLst>
+              <a:ext uri="{FF2B5EF4-FFF2-40B4-BE49-F238E27FC236}">
+                <a16:creationId xmlns:a16="http://schemas.microsoft.com/office/drawing/2014/main" id="{5E600BA7-FA45-884F-9820-9E5F2CB7AA48}"/>
+              </a:ext>
+            </a:extLst>
+          </p:cNvPr>
+          <p:cNvSpPr>
+            <a:spLocks noGrp="1"/>
+          </p:cNvSpPr>
+          <p:nvPr>
+            <p:ph type="body" idx="1"/>
+          </p:nvPr>
+        </p:nvSpPr>
+        <p:spPr>
+          <a:xfrm>
+            <a:off x="415600" y="1130134"/>
+            <a:ext cx="11360700" cy="4555200"/>
+          </a:xfrm>
+        </p:spPr>
+        <p:txBody>
+          <a:bodyPr/>
+          <a:lstStyle/>
+          <a:p>
+            <a:pPr marL="76200" indent="0" algn="ctr">
+              <a:buNone/>
+            </a:pPr>
+            <a:r>
+              <a:rPr lang="en-US" sz="3600" dirty="0"/>
+              <a:t>How’s teamwork going?</a:t>
+            </a:r>
+          </a:p>
+        </p:txBody>
+      </p:sp>
+      <p:sp>
+        <p:nvSpPr>
+          <p:cNvPr id="5" name="Text Placeholder 3">
+            <a:extLst>
+              <a:ext uri="{FF2B5EF4-FFF2-40B4-BE49-F238E27FC236}">
+                <a16:creationId xmlns:a16="http://schemas.microsoft.com/office/drawing/2014/main" id="{0CF60459-98F0-E844-AFCC-DC0705B0478D}"/>
+              </a:ext>
+            </a:extLst>
+          </p:cNvPr>
+          <p:cNvSpPr txBox="1">
+            <a:spLocks/>
+          </p:cNvSpPr>
+          <p:nvPr/>
+        </p:nvSpPr>
+        <p:spPr>
+          <a:xfrm>
+            <a:off x="3726942" y="2567943"/>
+            <a:ext cx="4886875" cy="2794571"/>
+          </a:xfrm>
+          <a:prstGeom prst="rect">
+            <a:avLst/>
+          </a:prstGeom>
+          <a:noFill/>
+          <a:ln>
+            <a:noFill/>
+          </a:ln>
+        </p:spPr>
+        <p:txBody>
+          <a:bodyPr spcFirstLastPara="1" wrap="none" lIns="121900" tIns="121900" rIns="121900" bIns="121900" rtlCol="0" anchor="t" anchorCtr="0">
+            <a:spAutoFit/>
+          </a:bodyPr>
+          <a:lstStyle>
+            <a:defPPr marR="0" lvl="0" algn="l" rtl="0">
+              <a:lnSpc>
+                <a:spcPct val="100000"/>
+              </a:lnSpc>
+              <a:spcBef>
+                <a:spcPts val="0"/>
+              </a:spcBef>
+              <a:spcAft>
+                <a:spcPts val="0"/>
+              </a:spcAft>
+            </a:defPPr>
+            <a:lvl1pPr marL="457200" marR="0" lvl="0" indent="-381000" algn="l" rtl="0">
+              <a:lnSpc>
+                <a:spcPct val="115000"/>
+              </a:lnSpc>
+              <a:spcBef>
+                <a:spcPts val="0"/>
+              </a:spcBef>
+              <a:spcAft>
+                <a:spcPts val="0"/>
+              </a:spcAft>
+              <a:buClr>
+                <a:srgbClr val="434343"/>
+              </a:buClr>
+              <a:buSzPts val="2400"/>
+              <a:buFont typeface="Arial"/>
+              <a:buChar char="●"/>
+              <a:defRPr sz="2400" b="0" i="0" u="none" strike="noStrike" cap="none">
+                <a:solidFill>
+                  <a:srgbClr val="434343"/>
+                </a:solidFill>
+                <a:latin typeface="Arial"/>
+                <a:ea typeface="Arial"/>
+                <a:cs typeface="Arial"/>
+                <a:sym typeface="Arial"/>
+              </a:defRPr>
+            </a:lvl1pPr>
+            <a:lvl2pPr marL="914400" marR="0" lvl="1" indent="-349250" algn="l" rtl="0">
+              <a:lnSpc>
+                <a:spcPct val="115000"/>
+              </a:lnSpc>
+              <a:spcBef>
+                <a:spcPts val="2100"/>
+              </a:spcBef>
+              <a:spcAft>
+                <a:spcPts val="0"/>
+              </a:spcAft>
+              <a:buClr>
+                <a:srgbClr val="434343"/>
+              </a:buClr>
+              <a:buSzPts val="1900"/>
+              <a:buFont typeface="Arial"/>
+              <a:buChar char="○"/>
+              <a:defRPr sz="1900" b="0" i="0" u="none" strike="noStrike" cap="none">
+                <a:solidFill>
+                  <a:srgbClr val="434343"/>
+                </a:solidFill>
+                <a:latin typeface="Arial"/>
+                <a:ea typeface="Arial"/>
+                <a:cs typeface="Arial"/>
+                <a:sym typeface="Arial"/>
+              </a:defRPr>
+            </a:lvl2pPr>
+            <a:lvl3pPr marL="1371600" marR="0" lvl="2" indent="-349250" algn="l" rtl="0">
+              <a:lnSpc>
+                <a:spcPct val="115000"/>
+              </a:lnSpc>
+              <a:spcBef>
+                <a:spcPts val="2100"/>
+              </a:spcBef>
+              <a:spcAft>
+                <a:spcPts val="0"/>
+              </a:spcAft>
+              <a:buClr>
+                <a:srgbClr val="434343"/>
+              </a:buClr>
+              <a:buSzPts val="1900"/>
+              <a:buFont typeface="Arial"/>
+              <a:buChar char="■"/>
+              <a:defRPr sz="1900" b="0" i="0" u="none" strike="noStrike" cap="none">
+                <a:solidFill>
+                  <a:srgbClr val="434343"/>
+                </a:solidFill>
+                <a:latin typeface="Arial"/>
+                <a:ea typeface="Arial"/>
+                <a:cs typeface="Arial"/>
+                <a:sym typeface="Arial"/>
+              </a:defRPr>
+            </a:lvl3pPr>
+            <a:lvl4pPr marL="1828800" marR="0" lvl="3" indent="-349250" algn="l" rtl="0">
+              <a:lnSpc>
+                <a:spcPct val="115000"/>
+              </a:lnSpc>
+              <a:spcBef>
+                <a:spcPts val="2100"/>
+              </a:spcBef>
+              <a:spcAft>
+                <a:spcPts val="0"/>
+              </a:spcAft>
+              <a:buClr>
+                <a:srgbClr val="434343"/>
+              </a:buClr>
+              <a:buSzPts val="1900"/>
+              <a:buFont typeface="Arial"/>
+              <a:buChar char="●"/>
+              <a:defRPr sz="1900" b="0" i="0" u="none" strike="noStrike" cap="none">
+                <a:solidFill>
+                  <a:srgbClr val="434343"/>
+                </a:solidFill>
+                <a:latin typeface="Arial"/>
+                <a:ea typeface="Arial"/>
+                <a:cs typeface="Arial"/>
+                <a:sym typeface="Arial"/>
+              </a:defRPr>
+            </a:lvl4pPr>
+            <a:lvl5pPr marL="2286000" marR="0" lvl="4" indent="-349250" algn="l" rtl="0">
+              <a:lnSpc>
+                <a:spcPct val="115000"/>
+              </a:lnSpc>
+              <a:spcBef>
+                <a:spcPts val="2100"/>
+              </a:spcBef>
+              <a:spcAft>
+                <a:spcPts val="0"/>
+              </a:spcAft>
+              <a:buClr>
+                <a:srgbClr val="434343"/>
+              </a:buClr>
+              <a:buSzPts val="1900"/>
+              <a:buFont typeface="Arial"/>
+              <a:buChar char="○"/>
+              <a:defRPr sz="1900" b="0" i="0" u="none" strike="noStrike" cap="none">
+                <a:solidFill>
+                  <a:srgbClr val="434343"/>
+                </a:solidFill>
+                <a:latin typeface="Arial"/>
+                <a:ea typeface="Arial"/>
+                <a:cs typeface="Arial"/>
+                <a:sym typeface="Arial"/>
+              </a:defRPr>
+            </a:lvl5pPr>
+            <a:lvl6pPr marL="2743200" marR="0" lvl="5" indent="-349250" algn="l" rtl="0">
+              <a:lnSpc>
+                <a:spcPct val="115000"/>
+              </a:lnSpc>
+              <a:spcBef>
+                <a:spcPts val="2100"/>
+              </a:spcBef>
+              <a:spcAft>
+                <a:spcPts val="0"/>
+              </a:spcAft>
+              <a:buClr>
+                <a:srgbClr val="434343"/>
+              </a:buClr>
+              <a:buSzPts val="1900"/>
+              <a:buFont typeface="Arial"/>
+              <a:buChar char="■"/>
+              <a:defRPr sz="1900" b="0" i="0" u="none" strike="noStrike" cap="none">
+                <a:solidFill>
+                  <a:srgbClr val="434343"/>
+                </a:solidFill>
+                <a:latin typeface="Arial"/>
+                <a:ea typeface="Arial"/>
+                <a:cs typeface="Arial"/>
+                <a:sym typeface="Arial"/>
+              </a:defRPr>
+            </a:lvl6pPr>
+            <a:lvl7pPr marL="3200400" marR="0" lvl="6" indent="-349250" algn="l" rtl="0">
+              <a:lnSpc>
+                <a:spcPct val="115000"/>
+              </a:lnSpc>
+              <a:spcBef>
+                <a:spcPts val="2100"/>
+              </a:spcBef>
+              <a:spcAft>
+                <a:spcPts val="0"/>
+              </a:spcAft>
+              <a:buClr>
+                <a:srgbClr val="434343"/>
+              </a:buClr>
+              <a:buSzPts val="1900"/>
+              <a:buFont typeface="Arial"/>
+              <a:buChar char="●"/>
+              <a:defRPr sz="1900" b="0" i="0" u="none" strike="noStrike" cap="none">
+                <a:solidFill>
+                  <a:srgbClr val="434343"/>
+                </a:solidFill>
+                <a:latin typeface="Arial"/>
+                <a:ea typeface="Arial"/>
+                <a:cs typeface="Arial"/>
+                <a:sym typeface="Arial"/>
+              </a:defRPr>
+            </a:lvl7pPr>
+            <a:lvl8pPr marL="3657600" marR="0" lvl="7" indent="-349250" algn="l" rtl="0">
+              <a:lnSpc>
+                <a:spcPct val="115000"/>
+              </a:lnSpc>
+              <a:spcBef>
+                <a:spcPts val="2100"/>
+              </a:spcBef>
+              <a:spcAft>
+                <a:spcPts val="0"/>
+              </a:spcAft>
+              <a:buClr>
+                <a:srgbClr val="434343"/>
+              </a:buClr>
+              <a:buSzPts val="1900"/>
+              <a:buFont typeface="Arial"/>
+              <a:buChar char="○"/>
+              <a:defRPr sz="1900" b="0" i="0" u="none" strike="noStrike" cap="none">
+                <a:solidFill>
+                  <a:srgbClr val="434343"/>
+                </a:solidFill>
+                <a:latin typeface="Arial"/>
+                <a:ea typeface="Arial"/>
+                <a:cs typeface="Arial"/>
+                <a:sym typeface="Arial"/>
+              </a:defRPr>
+            </a:lvl8pPr>
+            <a:lvl9pPr marL="4114800" marR="0" lvl="8" indent="-349250" algn="l" rtl="0">
+              <a:lnSpc>
+                <a:spcPct val="115000"/>
+              </a:lnSpc>
+              <a:spcBef>
+                <a:spcPts val="2100"/>
+              </a:spcBef>
+              <a:spcAft>
+                <a:spcPts val="2100"/>
+              </a:spcAft>
+              <a:buClr>
+                <a:srgbClr val="434343"/>
+              </a:buClr>
+              <a:buSzPts val="1900"/>
+              <a:buFont typeface="Arial"/>
+              <a:buChar char="■"/>
+              <a:defRPr sz="1900" b="0" i="0" u="none" strike="noStrike" cap="none">
+                <a:solidFill>
+                  <a:srgbClr val="434343"/>
+                </a:solidFill>
+                <a:latin typeface="Arial"/>
+                <a:ea typeface="Arial"/>
+                <a:cs typeface="Arial"/>
+                <a:sym typeface="Arial"/>
+              </a:defRPr>
+            </a:lvl9pPr>
+          </a:lstStyle>
+          <a:p>
+            <a:pPr marL="114300" indent="0" algn="ctr">
+              <a:buFont typeface="Arial"/>
+              <a:buNone/>
+            </a:pPr>
+            <a:r>
+              <a:rPr lang="en-US" sz="4800" dirty="0" err="1"/>
+              <a:t>sli.do</a:t>
+            </a:r>
+            <a:r>
+              <a:rPr lang="en-US" sz="4800" dirty="0"/>
+              <a:t>      #94889</a:t>
+            </a:r>
+          </a:p>
+          <a:p>
+            <a:pPr algn="ctr"/>
+            <a:endParaRPr lang="en-US" sz="4800" dirty="0"/>
+          </a:p>
+          <a:p>
+            <a:pPr marL="114300" indent="0" algn="ctr">
+              <a:buFont typeface="Arial"/>
+              <a:buNone/>
+            </a:pPr>
+            <a:r>
+              <a:rPr lang="en-US" sz="4800" dirty="0" err="1"/>
+              <a:t>sli.do</a:t>
+            </a:r>
+            <a:r>
+              <a:rPr lang="en-US" sz="4800" dirty="0"/>
+              <a:t>/94889</a:t>
+            </a:r>
+          </a:p>
+        </p:txBody>
+      </p:sp>
+    </p:spTree>
+    <p:extLst>
+      <p:ext uri="{BB962C8B-B14F-4D97-AF65-F5344CB8AC3E}">
+        <p14:creationId xmlns:p14="http://schemas.microsoft.com/office/powerpoint/2010/main" val="4066479944"/>
+      </p:ext>
+    </p:extLst>
+  </p:cSld>
+  <p:clrMapOvr>
+    <a:masterClrMapping/>
+  </p:clrMapOvr>
+</p:sld>
+</file>
+
+<file path=ppt/slides/slide20.xml><?xml version="1.0" encoding="utf-8"?>
 <p:sld xmlns:a="http://schemas.openxmlformats.org/drawingml/2006/main" xmlns:r="http://schemas.openxmlformats.org/officeDocument/2006/relationships" xmlns:p="http://schemas.openxmlformats.org/presentationml/2006/main">
   <p:cSld>
     <p:spTree>
@@ -13781,7 +14724,7 @@
 </p:sld>
 </file>
 
-<file path=ppt/slides/slide19.xml><?xml version="1.0" encoding="utf-8"?>
+<file path=ppt/slides/slide21.xml><?xml version="1.0" encoding="utf-8"?>
 <p:sld xmlns:a="http://schemas.openxmlformats.org/drawingml/2006/main" xmlns:r="http://schemas.openxmlformats.org/officeDocument/2006/relationships" xmlns:p="http://schemas.openxmlformats.org/presentationml/2006/main">
   <p:cSld>
     <p:spTree>
@@ -13869,154 +14812,7 @@
 </p:sld>
 </file>
 
-<file path=ppt/slides/slide2.xml><?xml version="1.0" encoding="utf-8"?>
-<p:sld xmlns:a="http://schemas.openxmlformats.org/drawingml/2006/main" xmlns:r="http://schemas.openxmlformats.org/officeDocument/2006/relationships" xmlns:p="http://schemas.openxmlformats.org/presentationml/2006/main">
-  <p:cSld>
-    <p:spTree>
-      <p:nvGrpSpPr>
-        <p:cNvPr id="1" name=""/>
-        <p:cNvGrpSpPr/>
-        <p:nvPr/>
-      </p:nvGrpSpPr>
-      <p:grpSpPr>
-        <a:xfrm>
-          <a:off x="0" y="0"/>
-          <a:ext cx="0" cy="0"/>
-          <a:chOff x="0" y="0"/>
-          <a:chExt cx="0" cy="0"/>
-        </a:xfrm>
-      </p:grpSpPr>
-      <p:sp>
-        <p:nvSpPr>
-          <p:cNvPr id="3" name="Title 2">
-            <a:extLst>
-              <a:ext uri="{FF2B5EF4-FFF2-40B4-BE49-F238E27FC236}">
-                <a16:creationId xmlns:a16="http://schemas.microsoft.com/office/drawing/2014/main" id="{9323871C-7CA8-1448-8FFC-1AE6E1838941}"/>
-              </a:ext>
-            </a:extLst>
-          </p:cNvPr>
-          <p:cNvSpPr>
-            <a:spLocks noGrp="1"/>
-          </p:cNvSpPr>
-          <p:nvPr>
-            <p:ph type="title"/>
-          </p:nvPr>
-        </p:nvSpPr>
-        <p:spPr/>
-        <p:txBody>
-          <a:bodyPr/>
-          <a:lstStyle/>
-          <a:p>
-            <a:r>
-              <a:rPr lang="en-US" dirty="0"/>
-              <a:t>Reminders</a:t>
-            </a:r>
-          </a:p>
-        </p:txBody>
-      </p:sp>
-      <p:sp>
-        <p:nvSpPr>
-          <p:cNvPr id="5" name="Text Placeholder 4">
-            <a:extLst>
-              <a:ext uri="{FF2B5EF4-FFF2-40B4-BE49-F238E27FC236}">
-                <a16:creationId xmlns:a16="http://schemas.microsoft.com/office/drawing/2014/main" id="{F4E0A5F0-1D89-954D-91FB-596CD9E690F2}"/>
-              </a:ext>
-            </a:extLst>
-          </p:cNvPr>
-          <p:cNvSpPr>
-            <a:spLocks noGrp="1"/>
-          </p:cNvSpPr>
-          <p:nvPr>
-            <p:ph type="body" idx="1"/>
-          </p:nvPr>
-        </p:nvSpPr>
-        <p:spPr/>
-        <p:txBody>
-          <a:bodyPr/>
-          <a:lstStyle/>
-          <a:p>
-            <a:pPr marL="76200" indent="0">
-              <a:buNone/>
-            </a:pPr>
-            <a:r>
-              <a:rPr lang="en-US" b="1" dirty="0"/>
-              <a:t>This week:</a:t>
-            </a:r>
-            <a:endParaRPr lang="en-US" dirty="0"/>
-          </a:p>
-          <a:p>
-            <a:r>
-              <a:rPr lang="en-US" dirty="0"/>
-              <a:t>Wednesday: Python + SQL Session</a:t>
-            </a:r>
-          </a:p>
-          <a:p>
-            <a:r>
-              <a:rPr lang="en-US" dirty="0"/>
-              <a:t>Thursday: Project Work Time (no class meeting)</a:t>
-            </a:r>
-          </a:p>
-          <a:p>
-            <a:r>
-              <a:rPr lang="en-US" dirty="0"/>
-              <a:t>Friday: Proposal Peer Evaluations Due (Email)</a:t>
-            </a:r>
-          </a:p>
-          <a:p>
-            <a:pPr marL="76200" indent="0">
-              <a:buNone/>
-            </a:pPr>
-            <a:endParaRPr lang="en-US" dirty="0"/>
-          </a:p>
-          <a:p>
-            <a:pPr marL="76200" indent="0">
-              <a:buNone/>
-            </a:pPr>
-            <a:r>
-              <a:rPr lang="en-US" b="1" dirty="0"/>
-              <a:t>Coming up next week:</a:t>
-            </a:r>
-          </a:p>
-          <a:p>
-            <a:r>
-              <a:rPr lang="en-US" dirty="0"/>
-              <a:t>Reading for Tuesday</a:t>
-            </a:r>
-          </a:p>
-          <a:p>
-            <a:r>
-              <a:rPr lang="en-US" dirty="0"/>
-              <a:t>Project check-in on Wednesday</a:t>
-            </a:r>
-          </a:p>
-          <a:p>
-            <a:r>
-              <a:rPr lang="en-US" dirty="0"/>
-              <a:t>Temporal Validation “whiteboard” session Thursday</a:t>
-            </a:r>
-          </a:p>
-          <a:p>
-            <a:r>
-              <a:rPr lang="en-US" dirty="0"/>
-              <a:t>Project Assignment due on Friday – we’ll post on Canvas</a:t>
-            </a:r>
-          </a:p>
-        </p:txBody>
-      </p:sp>
-    </p:spTree>
-    <p:extLst>
-      <p:ext uri="{BB962C8B-B14F-4D97-AF65-F5344CB8AC3E}">
-        <p14:creationId xmlns:p14="http://schemas.microsoft.com/office/powerpoint/2010/main" val="186046226"/>
-      </p:ext>
-    </p:extLst>
-  </p:cSld>
-  <p:clrMapOvr>
-    <a:masterClrMapping/>
-  </p:clrMapOvr>
-</p:sld>
-</file>
-
-<file path=ppt/slides/slide20.xml><?xml version="1.0" encoding="utf-8"?>
+<file path=ppt/slides/slide22.xml><?xml version="1.0" encoding="utf-8"?>
 <p:sld xmlns:a="http://schemas.openxmlformats.org/drawingml/2006/main" xmlns:r="http://schemas.openxmlformats.org/officeDocument/2006/relationships" xmlns:p="http://schemas.openxmlformats.org/presentationml/2006/main">
   <p:cSld>
     <p:spTree>
@@ -14125,7 +14921,7 @@
 </p:sld>
 </file>
 
-<file path=ppt/slides/slide21.xml><?xml version="1.0" encoding="utf-8"?>
+<file path=ppt/slides/slide23.xml><?xml version="1.0" encoding="utf-8"?>
 <p:sld xmlns:a="http://schemas.openxmlformats.org/drawingml/2006/main" xmlns:r="http://schemas.openxmlformats.org/officeDocument/2006/relationships" xmlns:p="http://schemas.openxmlformats.org/presentationml/2006/main">
   <p:cSld>
     <p:spTree>
@@ -14211,7 +15007,7 @@
 </p:sld>
 </file>
 
-<file path=ppt/slides/slide22.xml><?xml version="1.0" encoding="utf-8"?>
+<file path=ppt/slides/slide24.xml><?xml version="1.0" encoding="utf-8"?>
 <p:sld xmlns:a="http://schemas.openxmlformats.org/drawingml/2006/main" xmlns:r="http://schemas.openxmlformats.org/officeDocument/2006/relationships" xmlns:p="http://schemas.openxmlformats.org/presentationml/2006/main">
   <p:cSld>
     <p:spTree>
@@ -14293,7 +15089,7 @@
 </p:sld>
 </file>
 
-<file path=ppt/slides/slide23.xml><?xml version="1.0" encoding="utf-8"?>
+<file path=ppt/slides/slide25.xml><?xml version="1.0" encoding="utf-8"?>
 <p:sld xmlns:a="http://schemas.openxmlformats.org/drawingml/2006/main" xmlns:r="http://schemas.openxmlformats.org/officeDocument/2006/relationships" xmlns:p="http://schemas.openxmlformats.org/presentationml/2006/main">
   <p:cSld>
     <p:spTree>
@@ -14381,7 +15177,7 @@
 </p:sld>
 </file>
 
-<file path=ppt/slides/slide24.xml><?xml version="1.0" encoding="utf-8"?>
+<file path=ppt/slides/slide26.xml><?xml version="1.0" encoding="utf-8"?>
 <p:sld xmlns:a="http://schemas.openxmlformats.org/drawingml/2006/main" xmlns:r="http://schemas.openxmlformats.org/officeDocument/2006/relationships" xmlns:p="http://schemas.openxmlformats.org/presentationml/2006/main">
   <p:cSld>
     <p:spTree>
@@ -14531,7 +15327,7 @@
 </p:sld>
 </file>
 
-<file path=ppt/slides/slide25.xml><?xml version="1.0" encoding="utf-8"?>
+<file path=ppt/slides/slide27.xml><?xml version="1.0" encoding="utf-8"?>
 <p:sld xmlns:a="http://schemas.openxmlformats.org/drawingml/2006/main" xmlns:r="http://schemas.openxmlformats.org/officeDocument/2006/relationships" xmlns:p="http://schemas.openxmlformats.org/presentationml/2006/main">
   <p:cSld>
     <p:spTree>
@@ -14619,7 +15415,7 @@
 </p:sld>
 </file>
 
-<file path=ppt/slides/slide26.xml><?xml version="1.0" encoding="utf-8"?>
+<file path=ppt/slides/slide28.xml><?xml version="1.0" encoding="utf-8"?>
 <p:sld xmlns:a="http://schemas.openxmlformats.org/drawingml/2006/main" xmlns:r="http://schemas.openxmlformats.org/officeDocument/2006/relationships" xmlns:p="http://schemas.openxmlformats.org/presentationml/2006/main">
   <p:cSld>
     <p:spTree>
@@ -14777,7 +15573,7 @@
 </p:sld>
 </file>
 
-<file path=ppt/slides/slide27.xml><?xml version="1.0" encoding="utf-8"?>
+<file path=ppt/slides/slide29.xml><?xml version="1.0" encoding="utf-8"?>
 <p:sld xmlns:a="http://schemas.openxmlformats.org/drawingml/2006/main" xmlns:r="http://schemas.openxmlformats.org/officeDocument/2006/relationships" xmlns:p="http://schemas.openxmlformats.org/presentationml/2006/main">
   <p:cSld>
     <p:spTree>
@@ -14866,7 +15662,7 @@
 </p:sld>
 </file>
 
-<file path=ppt/slides/slide28.xml><?xml version="1.0" encoding="utf-8"?>
+<file path=ppt/slides/slide3.xml><?xml version="1.0" encoding="utf-8"?>
 <p:sld xmlns:a="http://schemas.openxmlformats.org/drawingml/2006/main" xmlns:r="http://schemas.openxmlformats.org/officeDocument/2006/relationships" xmlns:p="http://schemas.openxmlformats.org/presentationml/2006/main">
   <p:cSld>
     <p:spTree>
@@ -14927,7 +15723,12 @@
             <p:ph type="body" idx="1"/>
           </p:nvPr>
         </p:nvSpPr>
-        <p:spPr/>
+        <p:spPr>
+          <a:xfrm>
+            <a:off x="415600" y="1536632"/>
+            <a:ext cx="11360700" cy="4963021"/>
+          </a:xfrm>
+        </p:spPr>
         <p:txBody>
           <a:bodyPr/>
           <a:lstStyle/>
@@ -14944,7 +15745,7 @@
           <a:p>
             <a:r>
               <a:rPr lang="en-US" dirty="0"/>
-              <a:t>Wednesday: Python + SQL Session</a:t>
+              <a:t>Wednesday: Using triage for ML pipelines session (no prep assignment) - GHC 8102 (same room as last week)</a:t>
             </a:r>
           </a:p>
           <a:p>
@@ -14956,7 +15757,7 @@
           <a:p>
             <a:r>
               <a:rPr lang="en-US" dirty="0"/>
-              <a:t>Friday: Proposal Peer Evaluations Due (Email)</a:t>
+              <a:t>Sunday: Proposal Peer Evaluations Due (Email)</a:t>
             </a:r>
           </a:p>
           <a:p>
@@ -14977,13 +15778,13 @@
           <a:p>
             <a:r>
               <a:rPr lang="en-US" dirty="0"/>
-              <a:t>Reading for Tuesday</a:t>
+              <a:t>Reading for Tuesday (cross validation strategies)</a:t>
             </a:r>
           </a:p>
           <a:p>
             <a:r>
               <a:rPr lang="en-US" dirty="0"/>
-              <a:t>Project check-in on Wednesday</a:t>
+              <a:t>Project check-in on Wednesday (we’ll slack with times &amp; rooms)</a:t>
             </a:r>
           </a:p>
           <a:p>
@@ -15003,7 +15804,7 @@
     </p:spTree>
     <p:extLst>
       <p:ext uri="{BB962C8B-B14F-4D97-AF65-F5344CB8AC3E}">
-        <p14:creationId xmlns:p14="http://schemas.microsoft.com/office/powerpoint/2010/main" val="755837075"/>
+        <p14:creationId xmlns:p14="http://schemas.microsoft.com/office/powerpoint/2010/main" val="186046226"/>
       </p:ext>
     </p:extLst>
   </p:cSld>
@@ -15013,7 +15814,159 @@
 </p:sld>
 </file>
 
-<file path=ppt/slides/slide3.xml><?xml version="1.0" encoding="utf-8"?>
+<file path=ppt/slides/slide30.xml><?xml version="1.0" encoding="utf-8"?>
+<p:sld xmlns:a="http://schemas.openxmlformats.org/drawingml/2006/main" xmlns:r="http://schemas.openxmlformats.org/officeDocument/2006/relationships" xmlns:p="http://schemas.openxmlformats.org/presentationml/2006/main">
+  <p:cSld>
+    <p:spTree>
+      <p:nvGrpSpPr>
+        <p:cNvPr id="1" name=""/>
+        <p:cNvGrpSpPr/>
+        <p:nvPr/>
+      </p:nvGrpSpPr>
+      <p:grpSpPr>
+        <a:xfrm>
+          <a:off x="0" y="0"/>
+          <a:ext cx="0" cy="0"/>
+          <a:chOff x="0" y="0"/>
+          <a:chExt cx="0" cy="0"/>
+        </a:xfrm>
+      </p:grpSpPr>
+      <p:sp>
+        <p:nvSpPr>
+          <p:cNvPr id="3" name="Title 2">
+            <a:extLst>
+              <a:ext uri="{FF2B5EF4-FFF2-40B4-BE49-F238E27FC236}">
+                <a16:creationId xmlns:a16="http://schemas.microsoft.com/office/drawing/2014/main" id="{9323871C-7CA8-1448-8FFC-1AE6E1838941}"/>
+              </a:ext>
+            </a:extLst>
+          </p:cNvPr>
+          <p:cNvSpPr>
+            <a:spLocks noGrp="1"/>
+          </p:cNvSpPr>
+          <p:nvPr>
+            <p:ph type="title"/>
+          </p:nvPr>
+        </p:nvSpPr>
+        <p:spPr/>
+        <p:txBody>
+          <a:bodyPr/>
+          <a:lstStyle/>
+          <a:p>
+            <a:r>
+              <a:rPr lang="en-US" dirty="0"/>
+              <a:t>Reminders</a:t>
+            </a:r>
+          </a:p>
+        </p:txBody>
+      </p:sp>
+      <p:sp>
+        <p:nvSpPr>
+          <p:cNvPr id="5" name="Text Placeholder 4">
+            <a:extLst>
+              <a:ext uri="{FF2B5EF4-FFF2-40B4-BE49-F238E27FC236}">
+                <a16:creationId xmlns:a16="http://schemas.microsoft.com/office/drawing/2014/main" id="{F4E0A5F0-1D89-954D-91FB-596CD9E690F2}"/>
+              </a:ext>
+            </a:extLst>
+          </p:cNvPr>
+          <p:cNvSpPr>
+            <a:spLocks noGrp="1"/>
+          </p:cNvSpPr>
+          <p:nvPr>
+            <p:ph type="body" idx="1"/>
+          </p:nvPr>
+        </p:nvSpPr>
+        <p:spPr>
+          <a:xfrm>
+            <a:off x="415600" y="1536632"/>
+            <a:ext cx="11360700" cy="4963021"/>
+          </a:xfrm>
+        </p:spPr>
+        <p:txBody>
+          <a:bodyPr/>
+          <a:lstStyle/>
+          <a:p>
+            <a:pPr marL="76200" indent="0">
+              <a:buNone/>
+            </a:pPr>
+            <a:r>
+              <a:rPr lang="en-US" b="1" dirty="0"/>
+              <a:t>This week:</a:t>
+            </a:r>
+            <a:endParaRPr lang="en-US" dirty="0"/>
+          </a:p>
+          <a:p>
+            <a:r>
+              <a:rPr lang="en-US" dirty="0"/>
+              <a:t>Wednesday: Using triage for ML pipelines session (no prep assignment) - GHC 8102 (same room as last week)</a:t>
+            </a:r>
+          </a:p>
+          <a:p>
+            <a:r>
+              <a:rPr lang="en-US" dirty="0"/>
+              <a:t>Thursday: Project Work Time (no class meeting)</a:t>
+            </a:r>
+          </a:p>
+          <a:p>
+            <a:r>
+              <a:rPr lang="en-US" dirty="0"/>
+              <a:t>Friday: Proposal Peer Evaluations Due (Email)</a:t>
+            </a:r>
+          </a:p>
+          <a:p>
+            <a:pPr marL="76200" indent="0">
+              <a:buNone/>
+            </a:pPr>
+            <a:endParaRPr lang="en-US" dirty="0"/>
+          </a:p>
+          <a:p>
+            <a:pPr marL="76200" indent="0">
+              <a:buNone/>
+            </a:pPr>
+            <a:r>
+              <a:rPr lang="en-US" b="1" dirty="0"/>
+              <a:t>Coming up next week:</a:t>
+            </a:r>
+          </a:p>
+          <a:p>
+            <a:r>
+              <a:rPr lang="en-US" dirty="0"/>
+              <a:t>Reading for Tuesday (cross validation strategies)</a:t>
+            </a:r>
+          </a:p>
+          <a:p>
+            <a:r>
+              <a:rPr lang="en-US" dirty="0"/>
+              <a:t>Project check-in on Wednesday (we’ll slack with times &amp; rooms)</a:t>
+            </a:r>
+          </a:p>
+          <a:p>
+            <a:r>
+              <a:rPr lang="en-US" dirty="0"/>
+              <a:t>Temporal Validation “whiteboard” session Thursday</a:t>
+            </a:r>
+          </a:p>
+          <a:p>
+            <a:r>
+              <a:rPr lang="en-US" dirty="0"/>
+              <a:t>Project Assignment due on Friday – we’ll post on Canvas</a:t>
+            </a:r>
+          </a:p>
+        </p:txBody>
+      </p:sp>
+    </p:spTree>
+    <p:extLst>
+      <p:ext uri="{BB962C8B-B14F-4D97-AF65-F5344CB8AC3E}">
+        <p14:creationId xmlns:p14="http://schemas.microsoft.com/office/powerpoint/2010/main" val="2383078593"/>
+      </p:ext>
+    </p:extLst>
+  </p:cSld>
+  <p:clrMapOvr>
+    <a:masterClrMapping/>
+  </p:clrMapOvr>
+</p:sld>
+</file>
+
+<file path=ppt/slides/slide4.xml><?xml version="1.0" encoding="utf-8"?>
 <p:sld xmlns:a="http://schemas.openxmlformats.org/drawingml/2006/main" xmlns:r="http://schemas.openxmlformats.org/officeDocument/2006/relationships" xmlns:p="http://schemas.openxmlformats.org/presentationml/2006/main">
   <p:cSld>
     <p:spTree>
@@ -15137,7 +16090,7 @@
 </p:sld>
 </file>
 
-<file path=ppt/slides/slide4.xml><?xml version="1.0" encoding="utf-8"?>
+<file path=ppt/slides/slide5.xml><?xml version="1.0" encoding="utf-8"?>
 <p:sld xmlns:a="http://schemas.openxmlformats.org/drawingml/2006/main" xmlns:r="http://schemas.openxmlformats.org/officeDocument/2006/relationships" xmlns:p="http://schemas.openxmlformats.org/presentationml/2006/main">
   <p:cSld>
     <p:spTree>
@@ -15266,7 +16219,7 @@
 </p:sld>
 </file>
 
-<file path=ppt/slides/slide5.xml><?xml version="1.0" encoding="utf-8"?>
+<file path=ppt/slides/slide6.xml><?xml version="1.0" encoding="utf-8"?>
 <p:sld xmlns:a="http://schemas.openxmlformats.org/drawingml/2006/main" xmlns:r="http://schemas.openxmlformats.org/officeDocument/2006/relationships" xmlns:p="http://schemas.openxmlformats.org/presentationml/2006/main">
   <p:cSld>
     <p:spTree>
@@ -15376,7 +16329,7 @@
 </p:sld>
 </file>
 
-<file path=ppt/slides/slide6.xml><?xml version="1.0" encoding="utf-8"?>
+<file path=ppt/slides/slide7.xml><?xml version="1.0" encoding="utf-8"?>
 <p:sld xmlns:a="http://schemas.openxmlformats.org/drawingml/2006/main" xmlns:r="http://schemas.openxmlformats.org/officeDocument/2006/relationships" xmlns:p="http://schemas.openxmlformats.org/presentationml/2006/main">
   <p:cSld>
     <p:spTree>
@@ -15459,7 +16412,7 @@
 </p:sld>
 </file>
 
-<file path=ppt/slides/slide7.xml><?xml version="1.0" encoding="utf-8"?>
+<file path=ppt/slides/slide8.xml><?xml version="1.0" encoding="utf-8"?>
 <p:sld xmlns:a="http://schemas.openxmlformats.org/drawingml/2006/main" xmlns:r="http://schemas.openxmlformats.org/officeDocument/2006/relationships" xmlns:p="http://schemas.openxmlformats.org/presentationml/2006/main">
   <p:cSld>
     <p:spTree>
@@ -15559,7 +16512,7 @@
 </p:sld>
 </file>
 
-<file path=ppt/slides/slide8.xml><?xml version="1.0" encoding="utf-8"?>
+<file path=ppt/slides/slide9.xml><?xml version="1.0" encoding="utf-8"?>
 <p:sld xmlns:a="http://schemas.openxmlformats.org/drawingml/2006/main" xmlns:r="http://schemas.openxmlformats.org/officeDocument/2006/relationships" xmlns:p="http://schemas.openxmlformats.org/presentationml/2006/main">
   <p:cSld>
     <p:spTree>
@@ -15633,134 +16586,6 @@
     <p:extLst>
       <p:ext uri="{BB962C8B-B14F-4D97-AF65-F5344CB8AC3E}">
         <p14:creationId xmlns:p14="http://schemas.microsoft.com/office/powerpoint/2010/main" val="106807354"/>
-      </p:ext>
-    </p:extLst>
-  </p:cSld>
-  <p:clrMapOvr>
-    <a:masterClrMapping/>
-  </p:clrMapOvr>
-  <mc:AlternateContent xmlns:mc="http://schemas.openxmlformats.org/markup-compatibility/2006" xmlns:p14="http://schemas.microsoft.com/office/powerpoint/2010/main">
-    <mc:Choice Requires="p14">
-      <p:transition spd="med" p14:dur="700">
-        <p:fade/>
-      </p:transition>
-    </mc:Choice>
-    <mc:Fallback xmlns="">
-      <p:transition spd="med">
-        <p:fade/>
-      </p:transition>
-    </mc:Fallback>
-  </mc:AlternateContent>
-</p:sld>
-</file>
-
-<file path=ppt/slides/slide9.xml><?xml version="1.0" encoding="utf-8"?>
-<p:sld xmlns:a="http://schemas.openxmlformats.org/drawingml/2006/main" xmlns:r="http://schemas.openxmlformats.org/officeDocument/2006/relationships" xmlns:p="http://schemas.openxmlformats.org/presentationml/2006/main">
-  <p:cSld>
-    <p:spTree>
-      <p:nvGrpSpPr>
-        <p:cNvPr id="1" name=""/>
-        <p:cNvGrpSpPr/>
-        <p:nvPr/>
-      </p:nvGrpSpPr>
-      <p:grpSpPr>
-        <a:xfrm>
-          <a:off x="0" y="0"/>
-          <a:ext cx="0" cy="0"/>
-          <a:chOff x="0" y="0"/>
-          <a:chExt cx="0" cy="0"/>
-        </a:xfrm>
-      </p:grpSpPr>
-      <p:sp>
-        <p:nvSpPr>
-          <p:cNvPr id="4" name="Title 3">
-            <a:extLst>
-              <a:ext uri="{FF2B5EF4-FFF2-40B4-BE49-F238E27FC236}">
-                <a16:creationId xmlns:a16="http://schemas.microsoft.com/office/drawing/2014/main" id="{30C2C959-72F2-EF4D-80DA-F48A29D0F3C4}"/>
-              </a:ext>
-            </a:extLst>
-          </p:cNvPr>
-          <p:cNvSpPr>
-            <a:spLocks noGrp="1"/>
-          </p:cNvSpPr>
-          <p:nvPr>
-            <p:ph type="title"/>
-          </p:nvPr>
-        </p:nvSpPr>
-        <p:spPr/>
-        <p:txBody>
-          <a:bodyPr/>
-          <a:lstStyle/>
-          <a:p>
-            <a:r>
-              <a:rPr lang="en-US" dirty="0"/>
-              <a:t>What do we need our selected model to do?</a:t>
-            </a:r>
-          </a:p>
-        </p:txBody>
-      </p:sp>
-      <p:sp>
-        <p:nvSpPr>
-          <p:cNvPr id="5" name="Text Placeholder 4">
-            <a:extLst>
-              <a:ext uri="{FF2B5EF4-FFF2-40B4-BE49-F238E27FC236}">
-                <a16:creationId xmlns:a16="http://schemas.microsoft.com/office/drawing/2014/main" id="{24A75FF1-9EFE-0F41-92F5-3E749CFB2EB5}"/>
-              </a:ext>
-            </a:extLst>
-          </p:cNvPr>
-          <p:cNvSpPr>
-            <a:spLocks noGrp="1"/>
-          </p:cNvSpPr>
-          <p:nvPr>
-            <p:ph type="body" idx="1"/>
-          </p:nvPr>
-        </p:nvSpPr>
-        <p:spPr/>
-        <p:txBody>
-          <a:bodyPr/>
-          <a:lstStyle/>
-          <a:p>
-            <a:r>
-              <a:rPr lang="en-US" dirty="0"/>
-              <a:t>Perform well</a:t>
-            </a:r>
-          </a:p>
-          <a:p>
-            <a:pPr lvl="1"/>
-            <a:r>
-              <a:rPr lang="en-US" dirty="0"/>
-              <a:t>What metric?</a:t>
-            </a:r>
-          </a:p>
-          <a:p>
-            <a:pPr lvl="1"/>
-            <a:r>
-              <a:rPr lang="en-US" dirty="0"/>
-              <a:t>Compared to what?</a:t>
-            </a:r>
-          </a:p>
-          <a:p>
-            <a:endParaRPr lang="en-US" dirty="0"/>
-          </a:p>
-          <a:p>
-            <a:r>
-              <a:rPr lang="en-US" dirty="0"/>
-              <a:t>Generalize</a:t>
-            </a:r>
-          </a:p>
-          <a:p>
-            <a:pPr lvl="1"/>
-            <a:r>
-              <a:rPr lang="en-US" dirty="0"/>
-              <a:t>To what?</a:t>
-            </a:r>
-          </a:p>
-        </p:txBody>
-      </p:sp>
-    </p:spTree>
-    <p:extLst>
-      <p:ext uri="{BB962C8B-B14F-4D97-AF65-F5344CB8AC3E}">
-        <p14:creationId xmlns:p14="http://schemas.microsoft.com/office/powerpoint/2010/main" val="4111643116"/>
       </p:ext>
     </p:extLst>
   </p:cSld>

</xml_diff>